<commit_message>
user guide update, name change
</commit_message>
<xml_diff>
--- a/Docs/UserGuide/process.pptx
+++ b/Docs/UserGuide/process.pptx
@@ -6,6 +6,7 @@
   </p:sldMasterIdLst>
   <p:sldIdLst>
     <p:sldId id="261" r:id="rId2"/>
+    <p:sldId id="262" r:id="rId3"/>
   </p:sldIdLst>
   <p:sldSz cx="9144000" cy="6858000" type="screen4x3"/>
   <p:notesSz cx="6858000" cy="9144000"/>
@@ -288,7 +289,7 @@
           <a:p>
             <a:fld id="{B2B524B2-D71E-2B47-96DA-B9296F151D2C}" type="datetimeFigureOut">
               <a:rPr lang="en-US" smtClean="0"/>
-              <a:t>12/09/16</a:t>
+              <a:t>30/09/16</a:t>
             </a:fld>
             <a:endParaRPr lang="en-US"/>
           </a:p>
@@ -458,7 +459,7 @@
           <a:p>
             <a:fld id="{B2B524B2-D71E-2B47-96DA-B9296F151D2C}" type="datetimeFigureOut">
               <a:rPr lang="en-US" smtClean="0"/>
-              <a:t>12/09/16</a:t>
+              <a:t>30/09/16</a:t>
             </a:fld>
             <a:endParaRPr lang="en-US"/>
           </a:p>
@@ -638,7 +639,7 @@
           <a:p>
             <a:fld id="{B2B524B2-D71E-2B47-96DA-B9296F151D2C}" type="datetimeFigureOut">
               <a:rPr lang="en-US" smtClean="0"/>
-              <a:t>12/09/16</a:t>
+              <a:t>30/09/16</a:t>
             </a:fld>
             <a:endParaRPr lang="en-US"/>
           </a:p>
@@ -963,7 +964,7 @@
           <a:p>
             <a:fld id="{B2B524B2-D71E-2B47-96DA-B9296F151D2C}" type="datetimeFigureOut">
               <a:rPr lang="en-US" smtClean="0"/>
-              <a:t>12/09/16</a:t>
+              <a:t>30/09/16</a:t>
             </a:fld>
             <a:endParaRPr lang="en-US"/>
           </a:p>
@@ -1209,7 +1210,7 @@
           <a:p>
             <a:fld id="{B2B524B2-D71E-2B47-96DA-B9296F151D2C}" type="datetimeFigureOut">
               <a:rPr lang="en-US" smtClean="0"/>
-              <a:t>12/09/16</a:t>
+              <a:t>30/09/16</a:t>
             </a:fld>
             <a:endParaRPr lang="en-US"/>
           </a:p>
@@ -1497,7 +1498,7 @@
           <a:p>
             <a:fld id="{B2B524B2-D71E-2B47-96DA-B9296F151D2C}" type="datetimeFigureOut">
               <a:rPr lang="en-US" smtClean="0"/>
-              <a:t>12/09/16</a:t>
+              <a:t>30/09/16</a:t>
             </a:fld>
             <a:endParaRPr lang="en-US"/>
           </a:p>
@@ -1919,7 +1920,7 @@
           <a:p>
             <a:fld id="{B2B524B2-D71E-2B47-96DA-B9296F151D2C}" type="datetimeFigureOut">
               <a:rPr lang="en-US" smtClean="0"/>
-              <a:t>12/09/16</a:t>
+              <a:t>30/09/16</a:t>
             </a:fld>
             <a:endParaRPr lang="en-US"/>
           </a:p>
@@ -2037,7 +2038,7 @@
           <a:p>
             <a:fld id="{B2B524B2-D71E-2B47-96DA-B9296F151D2C}" type="datetimeFigureOut">
               <a:rPr lang="en-US" smtClean="0"/>
-              <a:t>12/09/16</a:t>
+              <a:t>30/09/16</a:t>
             </a:fld>
             <a:endParaRPr lang="en-US"/>
           </a:p>
@@ -2132,7 +2133,7 @@
           <a:p>
             <a:fld id="{B2B524B2-D71E-2B47-96DA-B9296F151D2C}" type="datetimeFigureOut">
               <a:rPr lang="en-US" smtClean="0"/>
-              <a:t>12/09/16</a:t>
+              <a:t>30/09/16</a:t>
             </a:fld>
             <a:endParaRPr lang="en-US"/>
           </a:p>
@@ -2409,7 +2410,7 @@
           <a:p>
             <a:fld id="{B2B524B2-D71E-2B47-96DA-B9296F151D2C}" type="datetimeFigureOut">
               <a:rPr lang="en-US" smtClean="0"/>
-              <a:t>12/09/16</a:t>
+              <a:t>30/09/16</a:t>
             </a:fld>
             <a:endParaRPr lang="en-US"/>
           </a:p>
@@ -2662,7 +2663,7 @@
           <a:p>
             <a:fld id="{B2B524B2-D71E-2B47-96DA-B9296F151D2C}" type="datetimeFigureOut">
               <a:rPr lang="en-US" smtClean="0"/>
-              <a:t>12/09/16</a:t>
+              <a:t>30/09/16</a:t>
             </a:fld>
             <a:endParaRPr lang="en-US"/>
           </a:p>
@@ -2875,7 +2876,7 @@
           <a:p>
             <a:fld id="{B2B524B2-D71E-2B47-96DA-B9296F151D2C}" type="datetimeFigureOut">
               <a:rPr lang="en-US" smtClean="0"/>
-              <a:t>12/09/16</a:t>
+              <a:t>30/09/16</a:t>
             </a:fld>
             <a:endParaRPr lang="en-US"/>
           </a:p>
@@ -4620,6 +4621,2110 @@
     <p:extLst>
       <p:ext uri="{BB962C8B-B14F-4D97-AF65-F5344CB8AC3E}">
         <p14:creationId xmlns:p14="http://schemas.microsoft.com/office/powerpoint/2010/main" val="702580859"/>
+      </p:ext>
+    </p:extLst>
+  </p:cSld>
+  <p:clrMapOvr>
+    <a:masterClrMapping/>
+  </p:clrMapOvr>
+  <mc:AlternateContent xmlns:mc="http://schemas.openxmlformats.org/markup-compatibility/2006" xmlns:p14="http://schemas.microsoft.com/office/powerpoint/2010/main">
+    <mc:Choice Requires="p14">
+      <p:transition spd="med" p14:dur="700">
+        <p:fade/>
+      </p:transition>
+    </mc:Choice>
+    <mc:Fallback xmlns="">
+      <p:transition spd="med">
+        <p:fade/>
+      </p:transition>
+    </mc:Fallback>
+  </mc:AlternateContent>
+  <p:timing>
+    <p:tnLst>
+      <p:par>
+        <p:cTn xmlns:p14="http://schemas.microsoft.com/office/powerpoint/2010/main" id="1" dur="indefinite" restart="never" nodeType="tmRoot">
+          <p:childTnLst>
+            <p:seq concurrent="1" nextAc="seek">
+              <p:cTn id="2" dur="indefinite" nodeType="mainSeq">
+                <p:childTnLst>
+                  <p:par>
+                    <p:cTn id="3" fill="hold">
+                      <p:stCondLst>
+                        <p:cond delay="indefinite"/>
+                      </p:stCondLst>
+                      <p:childTnLst>
+                        <p:par>
+                          <p:cTn id="4" fill="hold">
+                            <p:stCondLst>
+                              <p:cond delay="0"/>
+                            </p:stCondLst>
+                            <p:childTnLst>
+                              <p:par>
+                                <p:cTn id="5" presetID="1" presetClass="entr" presetSubtype="0" fill="hold" grpId="0" nodeType="clickEffect">
+                                  <p:stCondLst>
+                                    <p:cond delay="0"/>
+                                  </p:stCondLst>
+                                  <p:childTnLst>
+                                    <p:set>
+                                      <p:cBhvr>
+                                        <p:cTn id="6" dur="1" fill="hold">
+                                          <p:stCondLst>
+                                            <p:cond delay="0"/>
+                                          </p:stCondLst>
+                                        </p:cTn>
+                                        <p:tgtEl>
+                                          <p:spTgt spid="15"/>
+                                        </p:tgtEl>
+                                        <p:attrNameLst>
+                                          <p:attrName>style.visibility</p:attrName>
+                                        </p:attrNameLst>
+                                      </p:cBhvr>
+                                      <p:to>
+                                        <p:strVal val="visible"/>
+                                      </p:to>
+                                    </p:set>
+                                  </p:childTnLst>
+                                </p:cTn>
+                              </p:par>
+                            </p:childTnLst>
+                          </p:cTn>
+                        </p:par>
+                      </p:childTnLst>
+                    </p:cTn>
+                  </p:par>
+                  <p:par>
+                    <p:cTn id="7" fill="hold">
+                      <p:stCondLst>
+                        <p:cond delay="indefinite"/>
+                      </p:stCondLst>
+                      <p:childTnLst>
+                        <p:par>
+                          <p:cTn id="8" fill="hold">
+                            <p:stCondLst>
+                              <p:cond delay="0"/>
+                            </p:stCondLst>
+                            <p:childTnLst>
+                              <p:par>
+                                <p:cTn id="9" presetID="1" presetClass="entr" presetSubtype="0" fill="hold" grpId="0" nodeType="clickEffect">
+                                  <p:stCondLst>
+                                    <p:cond delay="0"/>
+                                  </p:stCondLst>
+                                  <p:childTnLst>
+                                    <p:set>
+                                      <p:cBhvr>
+                                        <p:cTn id="10" dur="1" fill="hold">
+                                          <p:stCondLst>
+                                            <p:cond delay="0"/>
+                                          </p:stCondLst>
+                                        </p:cTn>
+                                        <p:tgtEl>
+                                          <p:spTgt spid="10"/>
+                                        </p:tgtEl>
+                                        <p:attrNameLst>
+                                          <p:attrName>style.visibility</p:attrName>
+                                        </p:attrNameLst>
+                                      </p:cBhvr>
+                                      <p:to>
+                                        <p:strVal val="visible"/>
+                                      </p:to>
+                                    </p:set>
+                                  </p:childTnLst>
+                                </p:cTn>
+                              </p:par>
+                            </p:childTnLst>
+                          </p:cTn>
+                        </p:par>
+                      </p:childTnLst>
+                    </p:cTn>
+                  </p:par>
+                  <p:par>
+                    <p:cTn id="11" fill="hold">
+                      <p:stCondLst>
+                        <p:cond delay="indefinite"/>
+                      </p:stCondLst>
+                      <p:childTnLst>
+                        <p:par>
+                          <p:cTn id="12" fill="hold">
+                            <p:stCondLst>
+                              <p:cond delay="0"/>
+                            </p:stCondLst>
+                            <p:childTnLst>
+                              <p:par>
+                                <p:cTn id="13" presetID="1" presetClass="entr" presetSubtype="0" fill="hold" grpId="0" nodeType="clickEffect">
+                                  <p:stCondLst>
+                                    <p:cond delay="0"/>
+                                  </p:stCondLst>
+                                  <p:childTnLst>
+                                    <p:set>
+                                      <p:cBhvr>
+                                        <p:cTn id="14" dur="1" fill="hold">
+                                          <p:stCondLst>
+                                            <p:cond delay="0"/>
+                                          </p:stCondLst>
+                                        </p:cTn>
+                                        <p:tgtEl>
+                                          <p:spTgt spid="11"/>
+                                        </p:tgtEl>
+                                        <p:attrNameLst>
+                                          <p:attrName>style.visibility</p:attrName>
+                                        </p:attrNameLst>
+                                      </p:cBhvr>
+                                      <p:to>
+                                        <p:strVal val="visible"/>
+                                      </p:to>
+                                    </p:set>
+                                  </p:childTnLst>
+                                </p:cTn>
+                              </p:par>
+                            </p:childTnLst>
+                          </p:cTn>
+                        </p:par>
+                      </p:childTnLst>
+                    </p:cTn>
+                  </p:par>
+                  <p:par>
+                    <p:cTn id="15" fill="hold">
+                      <p:stCondLst>
+                        <p:cond delay="indefinite"/>
+                      </p:stCondLst>
+                      <p:childTnLst>
+                        <p:par>
+                          <p:cTn id="16" fill="hold">
+                            <p:stCondLst>
+                              <p:cond delay="0"/>
+                            </p:stCondLst>
+                            <p:childTnLst>
+                              <p:par>
+                                <p:cTn id="17" presetID="1" presetClass="entr" presetSubtype="0" fill="hold" grpId="0" nodeType="clickEffect">
+                                  <p:stCondLst>
+                                    <p:cond delay="0"/>
+                                  </p:stCondLst>
+                                  <p:childTnLst>
+                                    <p:set>
+                                      <p:cBhvr>
+                                        <p:cTn id="18" dur="1" fill="hold">
+                                          <p:stCondLst>
+                                            <p:cond delay="0"/>
+                                          </p:stCondLst>
+                                        </p:cTn>
+                                        <p:tgtEl>
+                                          <p:spTgt spid="14"/>
+                                        </p:tgtEl>
+                                        <p:attrNameLst>
+                                          <p:attrName>style.visibility</p:attrName>
+                                        </p:attrNameLst>
+                                      </p:cBhvr>
+                                      <p:to>
+                                        <p:strVal val="visible"/>
+                                      </p:to>
+                                    </p:set>
+                                  </p:childTnLst>
+                                </p:cTn>
+                              </p:par>
+                            </p:childTnLst>
+                          </p:cTn>
+                        </p:par>
+                      </p:childTnLst>
+                    </p:cTn>
+                  </p:par>
+                  <p:par>
+                    <p:cTn id="19" fill="hold">
+                      <p:stCondLst>
+                        <p:cond delay="indefinite"/>
+                      </p:stCondLst>
+                      <p:childTnLst>
+                        <p:par>
+                          <p:cTn id="20" fill="hold">
+                            <p:stCondLst>
+                              <p:cond delay="0"/>
+                            </p:stCondLst>
+                            <p:childTnLst>
+                              <p:par>
+                                <p:cTn id="21" presetID="1" presetClass="entr" presetSubtype="0" fill="hold" grpId="0" nodeType="clickEffect">
+                                  <p:stCondLst>
+                                    <p:cond delay="0"/>
+                                  </p:stCondLst>
+                                  <p:childTnLst>
+                                    <p:set>
+                                      <p:cBhvr>
+                                        <p:cTn id="22" dur="1" fill="hold">
+                                          <p:stCondLst>
+                                            <p:cond delay="0"/>
+                                          </p:stCondLst>
+                                        </p:cTn>
+                                        <p:tgtEl>
+                                          <p:spTgt spid="18"/>
+                                        </p:tgtEl>
+                                        <p:attrNameLst>
+                                          <p:attrName>style.visibility</p:attrName>
+                                        </p:attrNameLst>
+                                      </p:cBhvr>
+                                      <p:to>
+                                        <p:strVal val="visible"/>
+                                      </p:to>
+                                    </p:set>
+                                  </p:childTnLst>
+                                </p:cTn>
+                              </p:par>
+                            </p:childTnLst>
+                          </p:cTn>
+                        </p:par>
+                      </p:childTnLst>
+                    </p:cTn>
+                  </p:par>
+                  <p:par>
+                    <p:cTn id="23" fill="hold">
+                      <p:stCondLst>
+                        <p:cond delay="indefinite"/>
+                      </p:stCondLst>
+                      <p:childTnLst>
+                        <p:par>
+                          <p:cTn id="24" fill="hold">
+                            <p:stCondLst>
+                              <p:cond delay="0"/>
+                            </p:stCondLst>
+                            <p:childTnLst>
+                              <p:par>
+                                <p:cTn id="25" presetID="1" presetClass="entr" presetSubtype="0" fill="hold" grpId="0" nodeType="clickEffect">
+                                  <p:stCondLst>
+                                    <p:cond delay="0"/>
+                                  </p:stCondLst>
+                                  <p:childTnLst>
+                                    <p:set>
+                                      <p:cBhvr>
+                                        <p:cTn id="26" dur="1" fill="hold">
+                                          <p:stCondLst>
+                                            <p:cond delay="0"/>
+                                          </p:stCondLst>
+                                        </p:cTn>
+                                        <p:tgtEl>
+                                          <p:spTgt spid="19"/>
+                                        </p:tgtEl>
+                                        <p:attrNameLst>
+                                          <p:attrName>style.visibility</p:attrName>
+                                        </p:attrNameLst>
+                                      </p:cBhvr>
+                                      <p:to>
+                                        <p:strVal val="visible"/>
+                                      </p:to>
+                                    </p:set>
+                                  </p:childTnLst>
+                                </p:cTn>
+                              </p:par>
+                            </p:childTnLst>
+                          </p:cTn>
+                        </p:par>
+                      </p:childTnLst>
+                    </p:cTn>
+                  </p:par>
+                  <p:par>
+                    <p:cTn id="27" fill="hold">
+                      <p:stCondLst>
+                        <p:cond delay="indefinite"/>
+                      </p:stCondLst>
+                      <p:childTnLst>
+                        <p:par>
+                          <p:cTn id="28" fill="hold">
+                            <p:stCondLst>
+                              <p:cond delay="0"/>
+                            </p:stCondLst>
+                            <p:childTnLst>
+                              <p:par>
+                                <p:cTn id="29" presetID="1" presetClass="entr" presetSubtype="0" fill="hold" grpId="0" nodeType="clickEffect">
+                                  <p:stCondLst>
+                                    <p:cond delay="0"/>
+                                  </p:stCondLst>
+                                  <p:childTnLst>
+                                    <p:set>
+                                      <p:cBhvr>
+                                        <p:cTn id="30" dur="1" fill="hold">
+                                          <p:stCondLst>
+                                            <p:cond delay="0"/>
+                                          </p:stCondLst>
+                                        </p:cTn>
+                                        <p:tgtEl>
+                                          <p:spTgt spid="20"/>
+                                        </p:tgtEl>
+                                        <p:attrNameLst>
+                                          <p:attrName>style.visibility</p:attrName>
+                                        </p:attrNameLst>
+                                      </p:cBhvr>
+                                      <p:to>
+                                        <p:strVal val="visible"/>
+                                      </p:to>
+                                    </p:set>
+                                  </p:childTnLst>
+                                </p:cTn>
+                              </p:par>
+                            </p:childTnLst>
+                          </p:cTn>
+                        </p:par>
+                      </p:childTnLst>
+                    </p:cTn>
+                  </p:par>
+                  <p:par>
+                    <p:cTn id="31" fill="hold">
+                      <p:stCondLst>
+                        <p:cond delay="indefinite"/>
+                      </p:stCondLst>
+                      <p:childTnLst>
+                        <p:par>
+                          <p:cTn id="32" fill="hold">
+                            <p:stCondLst>
+                              <p:cond delay="0"/>
+                            </p:stCondLst>
+                            <p:childTnLst>
+                              <p:par>
+                                <p:cTn id="33" presetID="1" presetClass="entr" presetSubtype="0" fill="hold" grpId="0" nodeType="clickEffect">
+                                  <p:stCondLst>
+                                    <p:cond delay="0"/>
+                                  </p:stCondLst>
+                                  <p:childTnLst>
+                                    <p:set>
+                                      <p:cBhvr>
+                                        <p:cTn id="34" dur="1" fill="hold">
+                                          <p:stCondLst>
+                                            <p:cond delay="0"/>
+                                          </p:stCondLst>
+                                        </p:cTn>
+                                        <p:tgtEl>
+                                          <p:spTgt spid="21"/>
+                                        </p:tgtEl>
+                                        <p:attrNameLst>
+                                          <p:attrName>style.visibility</p:attrName>
+                                        </p:attrNameLst>
+                                      </p:cBhvr>
+                                      <p:to>
+                                        <p:strVal val="visible"/>
+                                      </p:to>
+                                    </p:set>
+                                  </p:childTnLst>
+                                </p:cTn>
+                              </p:par>
+                            </p:childTnLst>
+                          </p:cTn>
+                        </p:par>
+                      </p:childTnLst>
+                    </p:cTn>
+                  </p:par>
+                  <p:par>
+                    <p:cTn id="35" fill="hold">
+                      <p:stCondLst>
+                        <p:cond delay="indefinite"/>
+                      </p:stCondLst>
+                      <p:childTnLst>
+                        <p:par>
+                          <p:cTn id="36" fill="hold">
+                            <p:stCondLst>
+                              <p:cond delay="0"/>
+                            </p:stCondLst>
+                            <p:childTnLst>
+                              <p:par>
+                                <p:cTn id="37" presetID="1" presetClass="entr" presetSubtype="0" fill="hold" grpId="0" nodeType="clickEffect">
+                                  <p:stCondLst>
+                                    <p:cond delay="0"/>
+                                  </p:stCondLst>
+                                  <p:childTnLst>
+                                    <p:set>
+                                      <p:cBhvr>
+                                        <p:cTn id="38" dur="1" fill="hold">
+                                          <p:stCondLst>
+                                            <p:cond delay="0"/>
+                                          </p:stCondLst>
+                                        </p:cTn>
+                                        <p:tgtEl>
+                                          <p:spTgt spid="22"/>
+                                        </p:tgtEl>
+                                        <p:attrNameLst>
+                                          <p:attrName>style.visibility</p:attrName>
+                                        </p:attrNameLst>
+                                      </p:cBhvr>
+                                      <p:to>
+                                        <p:strVal val="visible"/>
+                                      </p:to>
+                                    </p:set>
+                                  </p:childTnLst>
+                                </p:cTn>
+                              </p:par>
+                            </p:childTnLst>
+                          </p:cTn>
+                        </p:par>
+                      </p:childTnLst>
+                    </p:cTn>
+                  </p:par>
+                  <p:par>
+                    <p:cTn id="39" fill="hold">
+                      <p:stCondLst>
+                        <p:cond delay="indefinite"/>
+                      </p:stCondLst>
+                      <p:childTnLst>
+                        <p:par>
+                          <p:cTn id="40" fill="hold">
+                            <p:stCondLst>
+                              <p:cond delay="0"/>
+                            </p:stCondLst>
+                            <p:childTnLst>
+                              <p:par>
+                                <p:cTn id="41" presetID="1" presetClass="entr" presetSubtype="0" fill="hold" grpId="0" nodeType="clickEffect">
+                                  <p:stCondLst>
+                                    <p:cond delay="0"/>
+                                  </p:stCondLst>
+                                  <p:childTnLst>
+                                    <p:set>
+                                      <p:cBhvr>
+                                        <p:cTn id="42" dur="1" fill="hold">
+                                          <p:stCondLst>
+                                            <p:cond delay="0"/>
+                                          </p:stCondLst>
+                                        </p:cTn>
+                                        <p:tgtEl>
+                                          <p:spTgt spid="23"/>
+                                        </p:tgtEl>
+                                        <p:attrNameLst>
+                                          <p:attrName>style.visibility</p:attrName>
+                                        </p:attrNameLst>
+                                      </p:cBhvr>
+                                      <p:to>
+                                        <p:strVal val="visible"/>
+                                      </p:to>
+                                    </p:set>
+                                  </p:childTnLst>
+                                </p:cTn>
+                              </p:par>
+                            </p:childTnLst>
+                          </p:cTn>
+                        </p:par>
+                      </p:childTnLst>
+                    </p:cTn>
+                  </p:par>
+                  <p:par>
+                    <p:cTn id="43" fill="hold">
+                      <p:stCondLst>
+                        <p:cond delay="indefinite"/>
+                      </p:stCondLst>
+                      <p:childTnLst>
+                        <p:par>
+                          <p:cTn id="44" fill="hold">
+                            <p:stCondLst>
+                              <p:cond delay="0"/>
+                            </p:stCondLst>
+                            <p:childTnLst>
+                              <p:par>
+                                <p:cTn id="45" presetID="1" presetClass="entr" presetSubtype="0" fill="hold" grpId="0" nodeType="clickEffect">
+                                  <p:stCondLst>
+                                    <p:cond delay="0"/>
+                                  </p:stCondLst>
+                                  <p:childTnLst>
+                                    <p:set>
+                                      <p:cBhvr>
+                                        <p:cTn id="46" dur="1" fill="hold">
+                                          <p:stCondLst>
+                                            <p:cond delay="0"/>
+                                          </p:stCondLst>
+                                        </p:cTn>
+                                        <p:tgtEl>
+                                          <p:spTgt spid="24"/>
+                                        </p:tgtEl>
+                                        <p:attrNameLst>
+                                          <p:attrName>style.visibility</p:attrName>
+                                        </p:attrNameLst>
+                                      </p:cBhvr>
+                                      <p:to>
+                                        <p:strVal val="visible"/>
+                                      </p:to>
+                                    </p:set>
+                                  </p:childTnLst>
+                                </p:cTn>
+                              </p:par>
+                            </p:childTnLst>
+                          </p:cTn>
+                        </p:par>
+                      </p:childTnLst>
+                    </p:cTn>
+                  </p:par>
+                  <p:par>
+                    <p:cTn id="47" fill="hold">
+                      <p:stCondLst>
+                        <p:cond delay="indefinite"/>
+                      </p:stCondLst>
+                      <p:childTnLst>
+                        <p:par>
+                          <p:cTn id="48" fill="hold">
+                            <p:stCondLst>
+                              <p:cond delay="0"/>
+                            </p:stCondLst>
+                            <p:childTnLst>
+                              <p:par>
+                                <p:cTn id="49" presetID="1" presetClass="entr" presetSubtype="0" fill="hold" grpId="0" nodeType="clickEffect">
+                                  <p:stCondLst>
+                                    <p:cond delay="0"/>
+                                  </p:stCondLst>
+                                  <p:childTnLst>
+                                    <p:set>
+                                      <p:cBhvr>
+                                        <p:cTn id="50" dur="1" fill="hold">
+                                          <p:stCondLst>
+                                            <p:cond delay="0"/>
+                                          </p:stCondLst>
+                                        </p:cTn>
+                                        <p:tgtEl>
+                                          <p:spTgt spid="25"/>
+                                        </p:tgtEl>
+                                        <p:attrNameLst>
+                                          <p:attrName>style.visibility</p:attrName>
+                                        </p:attrNameLst>
+                                      </p:cBhvr>
+                                      <p:to>
+                                        <p:strVal val="visible"/>
+                                      </p:to>
+                                    </p:set>
+                                  </p:childTnLst>
+                                </p:cTn>
+                              </p:par>
+                            </p:childTnLst>
+                          </p:cTn>
+                        </p:par>
+                      </p:childTnLst>
+                    </p:cTn>
+                  </p:par>
+                  <p:par>
+                    <p:cTn id="51" fill="hold">
+                      <p:stCondLst>
+                        <p:cond delay="indefinite"/>
+                      </p:stCondLst>
+                      <p:childTnLst>
+                        <p:par>
+                          <p:cTn id="52" fill="hold">
+                            <p:stCondLst>
+                              <p:cond delay="0"/>
+                            </p:stCondLst>
+                            <p:childTnLst>
+                              <p:par>
+                                <p:cTn id="53" presetID="1" presetClass="entr" presetSubtype="0" fill="hold" grpId="0" nodeType="clickEffect">
+                                  <p:stCondLst>
+                                    <p:cond delay="0"/>
+                                  </p:stCondLst>
+                                  <p:childTnLst>
+                                    <p:set>
+                                      <p:cBhvr>
+                                        <p:cTn id="54" dur="1" fill="hold">
+                                          <p:stCondLst>
+                                            <p:cond delay="0"/>
+                                          </p:stCondLst>
+                                        </p:cTn>
+                                        <p:tgtEl>
+                                          <p:spTgt spid="28"/>
+                                        </p:tgtEl>
+                                        <p:attrNameLst>
+                                          <p:attrName>style.visibility</p:attrName>
+                                        </p:attrNameLst>
+                                      </p:cBhvr>
+                                      <p:to>
+                                        <p:strVal val="visible"/>
+                                      </p:to>
+                                    </p:set>
+                                  </p:childTnLst>
+                                </p:cTn>
+                              </p:par>
+                            </p:childTnLst>
+                          </p:cTn>
+                        </p:par>
+                      </p:childTnLst>
+                    </p:cTn>
+                  </p:par>
+                  <p:par>
+                    <p:cTn id="55" fill="hold">
+                      <p:stCondLst>
+                        <p:cond delay="indefinite"/>
+                      </p:stCondLst>
+                      <p:childTnLst>
+                        <p:par>
+                          <p:cTn id="56" fill="hold">
+                            <p:stCondLst>
+                              <p:cond delay="0"/>
+                            </p:stCondLst>
+                            <p:childTnLst>
+                              <p:par>
+                                <p:cTn id="57" presetID="1" presetClass="entr" presetSubtype="0" fill="hold" grpId="0" nodeType="clickEffect">
+                                  <p:stCondLst>
+                                    <p:cond delay="0"/>
+                                  </p:stCondLst>
+                                  <p:childTnLst>
+                                    <p:set>
+                                      <p:cBhvr>
+                                        <p:cTn id="58" dur="1" fill="hold">
+                                          <p:stCondLst>
+                                            <p:cond delay="0"/>
+                                          </p:stCondLst>
+                                        </p:cTn>
+                                        <p:tgtEl>
+                                          <p:spTgt spid="29"/>
+                                        </p:tgtEl>
+                                        <p:attrNameLst>
+                                          <p:attrName>style.visibility</p:attrName>
+                                        </p:attrNameLst>
+                                      </p:cBhvr>
+                                      <p:to>
+                                        <p:strVal val="visible"/>
+                                      </p:to>
+                                    </p:set>
+                                  </p:childTnLst>
+                                </p:cTn>
+                              </p:par>
+                            </p:childTnLst>
+                          </p:cTn>
+                        </p:par>
+                      </p:childTnLst>
+                    </p:cTn>
+                  </p:par>
+                </p:childTnLst>
+              </p:cTn>
+              <p:prevCondLst>
+                <p:cond evt="onPrev" delay="0">
+                  <p:tgtEl>
+                    <p:sldTgt/>
+                  </p:tgtEl>
+                </p:cond>
+              </p:prevCondLst>
+              <p:nextCondLst>
+                <p:cond evt="onNext" delay="0">
+                  <p:tgtEl>
+                    <p:sldTgt/>
+                  </p:tgtEl>
+                </p:cond>
+              </p:nextCondLst>
+            </p:seq>
+          </p:childTnLst>
+        </p:cTn>
+      </p:par>
+    </p:tnLst>
+    <p:bldLst>
+      <p:bldP spid="15" grpId="0" animBg="1"/>
+      <p:bldP spid="10" grpId="0" animBg="1"/>
+      <p:bldP spid="11" grpId="0" animBg="1"/>
+      <p:bldP spid="14" grpId="0" animBg="1"/>
+      <p:bldP spid="18" grpId="0" animBg="1"/>
+      <p:bldP spid="19" grpId="0" animBg="1"/>
+      <p:bldP spid="20" grpId="0" animBg="1"/>
+      <p:bldP spid="21" grpId="0" animBg="1"/>
+      <p:bldP spid="22" grpId="0" animBg="1"/>
+      <p:bldP spid="23" grpId="0" animBg="1"/>
+      <p:bldP spid="24" grpId="0" animBg="1"/>
+      <p:bldP spid="25" grpId="0" animBg="1"/>
+      <p:bldP spid="28" grpId="0" animBg="1"/>
+      <p:bldP spid="29" grpId="0" animBg="1"/>
+    </p:bldLst>
+  </p:timing>
+</p:sld>
+</file>
+
+<file path=ppt/slides/slide2.xml><?xml version="1.0" encoding="utf-8"?>
+<p:sld xmlns:a="http://schemas.openxmlformats.org/drawingml/2006/main" xmlns:r="http://schemas.openxmlformats.org/officeDocument/2006/relationships" xmlns:p="http://schemas.openxmlformats.org/presentationml/2006/main">
+  <p:cSld>
+    <p:spTree>
+      <p:nvGrpSpPr>
+        <p:cNvPr id="1" name=""/>
+        <p:cNvGrpSpPr/>
+        <p:nvPr/>
+      </p:nvGrpSpPr>
+      <p:grpSpPr>
+        <a:xfrm>
+          <a:off x="0" y="0"/>
+          <a:ext cx="0" cy="0"/>
+          <a:chOff x="0" y="0"/>
+          <a:chExt cx="0" cy="0"/>
+        </a:xfrm>
+      </p:grpSpPr>
+      <p:sp>
+        <p:nvSpPr>
+          <p:cNvPr id="15" name="Rectangle 14"/>
+          <p:cNvSpPr/>
+          <p:nvPr/>
+        </p:nvSpPr>
+        <p:spPr>
+          <a:xfrm>
+            <a:off x="862790" y="1138119"/>
+            <a:ext cx="2226202" cy="1356209"/>
+          </a:xfrm>
+          <a:prstGeom prst="rect">
+            <a:avLst/>
+          </a:prstGeom>
+          <a:solidFill>
+            <a:schemeClr val="bg1">
+              <a:lumMod val="85000"/>
+            </a:schemeClr>
+          </a:solidFill>
+          <a:ln>
+            <a:noFill/>
+          </a:ln>
+          <a:effectLst/>
+        </p:spPr>
+        <p:style>
+          <a:lnRef idx="1">
+            <a:schemeClr val="accent1"/>
+          </a:lnRef>
+          <a:fillRef idx="3">
+            <a:schemeClr val="accent1"/>
+          </a:fillRef>
+          <a:effectRef idx="2">
+            <a:schemeClr val="accent1"/>
+          </a:effectRef>
+          <a:fontRef idx="minor">
+            <a:schemeClr val="lt1"/>
+          </a:fontRef>
+        </p:style>
+        <p:txBody>
+          <a:bodyPr lIns="45720" tIns="22860" rIns="45720" bIns="22860" rtlCol="0" anchor="ctr"/>
+          <a:lstStyle/>
+          <a:p>
+            <a:pPr algn="ctr"/>
+            <a:r>
+              <a:rPr lang="en-US" dirty="0">
+                <a:solidFill>
+                  <a:schemeClr val="tx1"/>
+                </a:solidFill>
+                <a:latin typeface="Arial"/>
+                <a:cs typeface="Arial"/>
+              </a:rPr>
+              <a:t>Portfolio Loading</a:t>
+            </a:r>
+          </a:p>
+          <a:p>
+            <a:pPr algn="ctr"/>
+            <a:r>
+              <a:rPr lang="en-US" dirty="0">
+                <a:solidFill>
+                  <a:schemeClr val="tx1"/>
+                </a:solidFill>
+                <a:latin typeface="Arial"/>
+                <a:cs typeface="Arial"/>
+              </a:rPr>
+              <a:t>“Curve” Building</a:t>
+            </a:r>
+          </a:p>
+          <a:p>
+            <a:pPr algn="ctr"/>
+            <a:r>
+              <a:rPr lang="en-US" dirty="0">
+                <a:solidFill>
+                  <a:schemeClr val="tx1"/>
+                </a:solidFill>
+                <a:latin typeface="Arial"/>
+                <a:cs typeface="Arial"/>
+              </a:rPr>
+              <a:t>Model Calibration </a:t>
+            </a:r>
+          </a:p>
+        </p:txBody>
+      </p:sp>
+      <p:sp>
+        <p:nvSpPr>
+          <p:cNvPr id="10" name="Rectangle 9"/>
+          <p:cNvSpPr/>
+          <p:nvPr/>
+        </p:nvSpPr>
+        <p:spPr>
+          <a:xfrm>
+            <a:off x="3577912" y="1138119"/>
+            <a:ext cx="2226202" cy="1356209"/>
+          </a:xfrm>
+          <a:prstGeom prst="rect">
+            <a:avLst/>
+          </a:prstGeom>
+          <a:solidFill>
+            <a:schemeClr val="bg1">
+              <a:lumMod val="85000"/>
+            </a:schemeClr>
+          </a:solidFill>
+          <a:ln>
+            <a:noFill/>
+          </a:ln>
+          <a:effectLst/>
+        </p:spPr>
+        <p:style>
+          <a:lnRef idx="1">
+            <a:schemeClr val="accent1"/>
+          </a:lnRef>
+          <a:fillRef idx="3">
+            <a:schemeClr val="accent1"/>
+          </a:fillRef>
+          <a:effectRef idx="2">
+            <a:schemeClr val="accent1"/>
+          </a:effectRef>
+          <a:fontRef idx="minor">
+            <a:schemeClr val="lt1"/>
+          </a:fontRef>
+        </p:style>
+        <p:txBody>
+          <a:bodyPr lIns="45720" tIns="22860" rIns="45720" bIns="22860" rtlCol="0" anchor="ctr"/>
+          <a:lstStyle/>
+          <a:p>
+            <a:pPr algn="ctr"/>
+            <a:r>
+              <a:rPr lang="en-US" dirty="0">
+                <a:solidFill>
+                  <a:schemeClr val="tx1"/>
+                </a:solidFill>
+                <a:latin typeface="Arial"/>
+                <a:cs typeface="Arial"/>
+              </a:rPr>
+              <a:t>t</a:t>
+            </a:r>
+            <a:r>
+              <a:rPr lang="en-US" baseline="-25000" dirty="0" smtClean="0">
+                <a:solidFill>
+                  <a:schemeClr val="tx1"/>
+                </a:solidFill>
+                <a:latin typeface="Arial"/>
+                <a:cs typeface="Arial"/>
+              </a:rPr>
+              <a:t>0</a:t>
+            </a:r>
+            <a:r>
+              <a:rPr lang="en-US" dirty="0" smtClean="0">
+                <a:solidFill>
+                  <a:schemeClr val="tx1"/>
+                </a:solidFill>
+                <a:latin typeface="Arial"/>
+                <a:cs typeface="Arial"/>
+              </a:rPr>
+              <a:t> Pricing</a:t>
+            </a:r>
+            <a:endParaRPr lang="en-US" dirty="0">
+              <a:solidFill>
+                <a:schemeClr val="tx1"/>
+              </a:solidFill>
+              <a:latin typeface="Arial"/>
+              <a:cs typeface="Arial"/>
+            </a:endParaRPr>
+          </a:p>
+          <a:p>
+            <a:pPr algn="ctr"/>
+            <a:r>
+              <a:rPr lang="en-US" dirty="0" smtClean="0">
+                <a:solidFill>
+                  <a:schemeClr val="tx1"/>
+                </a:solidFill>
+                <a:latin typeface="Arial"/>
+                <a:cs typeface="Arial"/>
+              </a:rPr>
+              <a:t>Market Simulation</a:t>
+            </a:r>
+          </a:p>
+          <a:p>
+            <a:pPr algn="ctr"/>
+            <a:r>
+              <a:rPr lang="en-US" dirty="0" smtClean="0">
+                <a:solidFill>
+                  <a:schemeClr val="tx1"/>
+                </a:solidFill>
+                <a:latin typeface="Arial"/>
+                <a:cs typeface="Arial"/>
+              </a:rPr>
+              <a:t>Forward Pricing</a:t>
+            </a:r>
+            <a:endParaRPr lang="en-US" dirty="0">
+              <a:solidFill>
+                <a:schemeClr val="tx1"/>
+              </a:solidFill>
+              <a:latin typeface="Arial"/>
+              <a:cs typeface="Arial"/>
+            </a:endParaRPr>
+          </a:p>
+        </p:txBody>
+      </p:sp>
+      <p:sp>
+        <p:nvSpPr>
+          <p:cNvPr id="11" name="Rectangle 10"/>
+          <p:cNvSpPr/>
+          <p:nvPr/>
+        </p:nvSpPr>
+        <p:spPr>
+          <a:xfrm>
+            <a:off x="6258714" y="1138119"/>
+            <a:ext cx="2226202" cy="1356209"/>
+          </a:xfrm>
+          <a:prstGeom prst="rect">
+            <a:avLst/>
+          </a:prstGeom>
+          <a:solidFill>
+            <a:schemeClr val="bg1">
+              <a:lumMod val="85000"/>
+            </a:schemeClr>
+          </a:solidFill>
+          <a:ln>
+            <a:noFill/>
+          </a:ln>
+          <a:effectLst/>
+        </p:spPr>
+        <p:style>
+          <a:lnRef idx="1">
+            <a:schemeClr val="accent1"/>
+          </a:lnRef>
+          <a:fillRef idx="3">
+            <a:schemeClr val="accent1"/>
+          </a:fillRef>
+          <a:effectRef idx="2">
+            <a:schemeClr val="accent1"/>
+          </a:effectRef>
+          <a:fontRef idx="minor">
+            <a:schemeClr val="lt1"/>
+          </a:fontRef>
+        </p:style>
+        <p:txBody>
+          <a:bodyPr lIns="45720" tIns="22860" rIns="45720" bIns="22860" rtlCol="0" anchor="ctr"/>
+          <a:lstStyle/>
+          <a:p>
+            <a:pPr algn="ctr"/>
+            <a:r>
+              <a:rPr lang="en-US" dirty="0">
+                <a:solidFill>
+                  <a:schemeClr val="tx1"/>
+                </a:solidFill>
+                <a:latin typeface="Arial"/>
+                <a:cs typeface="Arial"/>
+              </a:rPr>
+              <a:t>Aggregation</a:t>
+            </a:r>
+          </a:p>
+          <a:p>
+            <a:pPr algn="ctr"/>
+            <a:r>
+              <a:rPr lang="en-US" dirty="0">
+                <a:solidFill>
+                  <a:schemeClr val="tx1"/>
+                </a:solidFill>
+                <a:latin typeface="Arial"/>
+                <a:cs typeface="Arial"/>
+              </a:rPr>
+              <a:t>Collateral </a:t>
+            </a:r>
+            <a:r>
+              <a:rPr lang="en-US" dirty="0" smtClean="0">
+                <a:solidFill>
+                  <a:schemeClr val="tx1"/>
+                </a:solidFill>
+                <a:latin typeface="Arial"/>
+                <a:cs typeface="Arial"/>
+              </a:rPr>
+              <a:t>Modeling</a:t>
+            </a:r>
+          </a:p>
+          <a:p>
+            <a:pPr algn="ctr"/>
+            <a:r>
+              <a:rPr lang="en-US" dirty="0" smtClean="0">
+                <a:solidFill>
+                  <a:schemeClr val="tx1"/>
+                </a:solidFill>
+                <a:latin typeface="Arial"/>
+                <a:cs typeface="Arial"/>
+              </a:rPr>
+              <a:t>Exposure Analytics</a:t>
+            </a:r>
+            <a:endParaRPr lang="en-US" dirty="0">
+              <a:solidFill>
+                <a:schemeClr val="tx1"/>
+              </a:solidFill>
+              <a:latin typeface="Arial"/>
+              <a:cs typeface="Arial"/>
+            </a:endParaRPr>
+          </a:p>
+        </p:txBody>
+      </p:sp>
+      <p:sp>
+        <p:nvSpPr>
+          <p:cNvPr id="4" name="Up Arrow 3"/>
+          <p:cNvSpPr/>
+          <p:nvPr/>
+        </p:nvSpPr>
+        <p:spPr>
+          <a:xfrm>
+            <a:off x="1807629" y="2540093"/>
+            <a:ext cx="251696" cy="423353"/>
+          </a:xfrm>
+          <a:prstGeom prst="upArrow">
+            <a:avLst/>
+          </a:prstGeom>
+          <a:solidFill>
+            <a:schemeClr val="bg1">
+              <a:lumMod val="75000"/>
+            </a:schemeClr>
+          </a:solidFill>
+          <a:ln>
+            <a:noFill/>
+          </a:ln>
+          <a:effectLst/>
+        </p:spPr>
+        <p:style>
+          <a:lnRef idx="1">
+            <a:schemeClr val="accent1"/>
+          </a:lnRef>
+          <a:fillRef idx="3">
+            <a:schemeClr val="accent1"/>
+          </a:fillRef>
+          <a:effectRef idx="2">
+            <a:schemeClr val="accent1"/>
+          </a:effectRef>
+          <a:fontRef idx="minor">
+            <a:schemeClr val="lt1"/>
+          </a:fontRef>
+        </p:style>
+        <p:txBody>
+          <a:bodyPr lIns="45720" tIns="22860" rIns="45720" bIns="22860" rtlCol="0" anchor="ctr"/>
+          <a:lstStyle/>
+          <a:p>
+            <a:pPr algn="ctr"/>
+            <a:endParaRPr lang="en-US">
+              <a:latin typeface="Arial"/>
+              <a:cs typeface="Arial"/>
+            </a:endParaRPr>
+          </a:p>
+        </p:txBody>
+      </p:sp>
+      <p:sp>
+        <p:nvSpPr>
+          <p:cNvPr id="14" name="Rectangle 13"/>
+          <p:cNvSpPr/>
+          <p:nvPr/>
+        </p:nvSpPr>
+        <p:spPr>
+          <a:xfrm>
+            <a:off x="862790" y="3054983"/>
+            <a:ext cx="2226202" cy="396000"/>
+          </a:xfrm>
+          <a:prstGeom prst="rect">
+            <a:avLst/>
+          </a:prstGeom>
+          <a:solidFill>
+            <a:schemeClr val="accent5">
+              <a:lumMod val="60000"/>
+              <a:lumOff val="40000"/>
+            </a:schemeClr>
+          </a:solidFill>
+          <a:ln>
+            <a:noFill/>
+          </a:ln>
+          <a:effectLst/>
+        </p:spPr>
+        <p:style>
+          <a:lnRef idx="1">
+            <a:schemeClr val="accent1"/>
+          </a:lnRef>
+          <a:fillRef idx="3">
+            <a:schemeClr val="accent1"/>
+          </a:fillRef>
+          <a:effectRef idx="2">
+            <a:schemeClr val="accent1"/>
+          </a:effectRef>
+          <a:fontRef idx="minor">
+            <a:schemeClr val="lt1"/>
+          </a:fontRef>
+        </p:style>
+        <p:txBody>
+          <a:bodyPr lIns="45720" tIns="22860" rIns="45720" bIns="22860" rtlCol="0" anchor="ctr"/>
+          <a:lstStyle/>
+          <a:p>
+            <a:pPr algn="ctr"/>
+            <a:r>
+              <a:rPr lang="en-US" dirty="0">
+                <a:solidFill>
+                  <a:schemeClr val="tx1"/>
+                </a:solidFill>
+                <a:latin typeface="Arial"/>
+                <a:cs typeface="Arial"/>
+              </a:rPr>
+              <a:t>Trade data </a:t>
+            </a:r>
+            <a:r>
+              <a:rPr lang="en-US" dirty="0" smtClean="0">
+                <a:solidFill>
+                  <a:schemeClr val="tx1"/>
+                </a:solidFill>
+                <a:latin typeface="Arial"/>
+                <a:cs typeface="Arial"/>
+              </a:rPr>
+              <a:t>(xml)</a:t>
+            </a:r>
+            <a:endParaRPr lang="en-US" dirty="0">
+              <a:solidFill>
+                <a:schemeClr val="tx1"/>
+              </a:solidFill>
+              <a:latin typeface="Arial"/>
+              <a:cs typeface="Arial"/>
+            </a:endParaRPr>
+          </a:p>
+        </p:txBody>
+      </p:sp>
+      <p:sp>
+        <p:nvSpPr>
+          <p:cNvPr id="5" name="Chevron 4"/>
+          <p:cNvSpPr/>
+          <p:nvPr/>
+        </p:nvSpPr>
+        <p:spPr>
+          <a:xfrm>
+            <a:off x="3188928" y="1639839"/>
+            <a:ext cx="277607" cy="400468"/>
+          </a:xfrm>
+          <a:prstGeom prst="chevron">
+            <a:avLst/>
+          </a:prstGeom>
+          <a:solidFill>
+            <a:schemeClr val="bg1">
+              <a:lumMod val="75000"/>
+            </a:schemeClr>
+          </a:solidFill>
+          <a:ln>
+            <a:noFill/>
+          </a:ln>
+          <a:effectLst/>
+        </p:spPr>
+        <p:style>
+          <a:lnRef idx="1">
+            <a:schemeClr val="accent1"/>
+          </a:lnRef>
+          <a:fillRef idx="3">
+            <a:schemeClr val="accent1"/>
+          </a:fillRef>
+          <a:effectRef idx="2">
+            <a:schemeClr val="accent1"/>
+          </a:effectRef>
+          <a:fontRef idx="minor">
+            <a:schemeClr val="lt1"/>
+          </a:fontRef>
+        </p:style>
+        <p:txBody>
+          <a:bodyPr lIns="45720" tIns="22860" rIns="45720" bIns="22860" rtlCol="0" anchor="ctr"/>
+          <a:lstStyle/>
+          <a:p>
+            <a:pPr algn="ctr"/>
+            <a:endParaRPr lang="en-US">
+              <a:latin typeface="Arial"/>
+              <a:cs typeface="Arial"/>
+            </a:endParaRPr>
+          </a:p>
+        </p:txBody>
+      </p:sp>
+      <p:sp>
+        <p:nvSpPr>
+          <p:cNvPr id="16" name="Chevron 15"/>
+          <p:cNvSpPr/>
+          <p:nvPr/>
+        </p:nvSpPr>
+        <p:spPr>
+          <a:xfrm>
+            <a:off x="5901020" y="1639839"/>
+            <a:ext cx="277607" cy="400468"/>
+          </a:xfrm>
+          <a:prstGeom prst="chevron">
+            <a:avLst/>
+          </a:prstGeom>
+          <a:solidFill>
+            <a:schemeClr val="bg1">
+              <a:lumMod val="75000"/>
+            </a:schemeClr>
+          </a:solidFill>
+          <a:ln>
+            <a:noFill/>
+          </a:ln>
+          <a:effectLst/>
+        </p:spPr>
+        <p:style>
+          <a:lnRef idx="1">
+            <a:schemeClr val="accent1"/>
+          </a:lnRef>
+          <a:fillRef idx="3">
+            <a:schemeClr val="accent1"/>
+          </a:fillRef>
+          <a:effectRef idx="2">
+            <a:schemeClr val="accent1"/>
+          </a:effectRef>
+          <a:fontRef idx="minor">
+            <a:schemeClr val="lt1"/>
+          </a:fontRef>
+        </p:style>
+        <p:txBody>
+          <a:bodyPr lIns="45720" tIns="22860" rIns="45720" bIns="22860" rtlCol="0" anchor="ctr"/>
+          <a:lstStyle/>
+          <a:p>
+            <a:pPr algn="ctr"/>
+            <a:endParaRPr lang="en-US">
+              <a:latin typeface="Arial"/>
+              <a:cs typeface="Arial"/>
+            </a:endParaRPr>
+          </a:p>
+        </p:txBody>
+      </p:sp>
+      <p:sp>
+        <p:nvSpPr>
+          <p:cNvPr id="6" name="Down Arrow 5"/>
+          <p:cNvSpPr/>
+          <p:nvPr/>
+        </p:nvSpPr>
+        <p:spPr>
+          <a:xfrm>
+            <a:off x="7207651" y="2540093"/>
+            <a:ext cx="274578" cy="423353"/>
+          </a:xfrm>
+          <a:prstGeom prst="downArrow">
+            <a:avLst/>
+          </a:prstGeom>
+          <a:solidFill>
+            <a:schemeClr val="bg1">
+              <a:lumMod val="75000"/>
+            </a:schemeClr>
+          </a:solidFill>
+          <a:ln>
+            <a:noFill/>
+          </a:ln>
+          <a:effectLst/>
+        </p:spPr>
+        <p:style>
+          <a:lnRef idx="1">
+            <a:schemeClr val="accent1"/>
+          </a:lnRef>
+          <a:fillRef idx="3">
+            <a:schemeClr val="accent1"/>
+          </a:fillRef>
+          <a:effectRef idx="2">
+            <a:schemeClr val="accent1"/>
+          </a:effectRef>
+          <a:fontRef idx="minor">
+            <a:schemeClr val="lt1"/>
+          </a:fontRef>
+        </p:style>
+        <p:txBody>
+          <a:bodyPr lIns="45720" tIns="22860" rIns="45720" bIns="22860" rtlCol="0" anchor="ctr"/>
+          <a:lstStyle/>
+          <a:p>
+            <a:pPr algn="ctr"/>
+            <a:endParaRPr lang="en-US">
+              <a:latin typeface="Arial"/>
+              <a:cs typeface="Arial"/>
+            </a:endParaRPr>
+          </a:p>
+        </p:txBody>
+      </p:sp>
+      <p:sp>
+        <p:nvSpPr>
+          <p:cNvPr id="17" name="Down Arrow 16"/>
+          <p:cNvSpPr/>
+          <p:nvPr/>
+        </p:nvSpPr>
+        <p:spPr>
+          <a:xfrm>
+            <a:off x="4579955" y="2540093"/>
+            <a:ext cx="274578" cy="423353"/>
+          </a:xfrm>
+          <a:prstGeom prst="downArrow">
+            <a:avLst/>
+          </a:prstGeom>
+          <a:solidFill>
+            <a:schemeClr val="bg1">
+              <a:lumMod val="75000"/>
+            </a:schemeClr>
+          </a:solidFill>
+          <a:ln>
+            <a:noFill/>
+          </a:ln>
+          <a:effectLst/>
+        </p:spPr>
+        <p:style>
+          <a:lnRef idx="1">
+            <a:schemeClr val="accent1"/>
+          </a:lnRef>
+          <a:fillRef idx="3">
+            <a:schemeClr val="accent1"/>
+          </a:fillRef>
+          <a:effectRef idx="2">
+            <a:schemeClr val="accent1"/>
+          </a:effectRef>
+          <a:fontRef idx="minor">
+            <a:schemeClr val="lt1"/>
+          </a:fontRef>
+        </p:style>
+        <p:txBody>
+          <a:bodyPr lIns="45720" tIns="22860" rIns="45720" bIns="22860" rtlCol="0" anchor="ctr"/>
+          <a:lstStyle/>
+          <a:p>
+            <a:pPr algn="ctr"/>
+            <a:endParaRPr lang="en-US">
+              <a:latin typeface="Arial"/>
+              <a:cs typeface="Arial"/>
+            </a:endParaRPr>
+          </a:p>
+        </p:txBody>
+      </p:sp>
+      <p:sp>
+        <p:nvSpPr>
+          <p:cNvPr id="18" name="Rectangle 17"/>
+          <p:cNvSpPr/>
+          <p:nvPr/>
+        </p:nvSpPr>
+        <p:spPr>
+          <a:xfrm>
+            <a:off x="3577912" y="3054983"/>
+            <a:ext cx="2226202" cy="648000"/>
+          </a:xfrm>
+          <a:prstGeom prst="rect">
+            <a:avLst/>
+          </a:prstGeom>
+          <a:solidFill>
+            <a:schemeClr val="accent3">
+              <a:lumMod val="60000"/>
+              <a:lumOff val="40000"/>
+            </a:schemeClr>
+          </a:solidFill>
+          <a:ln>
+            <a:noFill/>
+          </a:ln>
+          <a:effectLst/>
+        </p:spPr>
+        <p:style>
+          <a:lnRef idx="1">
+            <a:schemeClr val="accent1"/>
+          </a:lnRef>
+          <a:fillRef idx="3">
+            <a:schemeClr val="accent1"/>
+          </a:fillRef>
+          <a:effectRef idx="2">
+            <a:schemeClr val="accent1"/>
+          </a:effectRef>
+          <a:fontRef idx="minor">
+            <a:schemeClr val="lt1"/>
+          </a:fontRef>
+        </p:style>
+        <p:txBody>
+          <a:bodyPr lIns="45720" tIns="22860" rIns="45720" bIns="22860" rtlCol="0" anchor="ctr"/>
+          <a:lstStyle/>
+          <a:p>
+            <a:pPr algn="ctr"/>
+            <a:r>
+              <a:rPr lang="en-US" dirty="0">
+                <a:solidFill>
+                  <a:schemeClr val="tx1"/>
+                </a:solidFill>
+                <a:latin typeface="Arial"/>
+                <a:cs typeface="Arial"/>
+              </a:rPr>
+              <a:t>NPV Report</a:t>
+            </a:r>
+          </a:p>
+          <a:p>
+            <a:pPr algn="ctr"/>
+            <a:r>
+              <a:rPr lang="en-US" dirty="0" err="1">
+                <a:solidFill>
+                  <a:schemeClr val="tx1"/>
+                </a:solidFill>
+                <a:latin typeface="Arial"/>
+                <a:cs typeface="Arial"/>
+              </a:rPr>
+              <a:t>Cashflow</a:t>
+            </a:r>
+            <a:r>
+              <a:rPr lang="en-US" dirty="0">
+                <a:solidFill>
+                  <a:schemeClr val="tx1"/>
+                </a:solidFill>
+                <a:latin typeface="Arial"/>
+                <a:cs typeface="Arial"/>
+              </a:rPr>
+              <a:t> Report</a:t>
+            </a:r>
+          </a:p>
+        </p:txBody>
+      </p:sp>
+      <p:sp>
+        <p:nvSpPr>
+          <p:cNvPr id="19" name="Rectangle 18"/>
+          <p:cNvSpPr/>
+          <p:nvPr/>
+        </p:nvSpPr>
+        <p:spPr>
+          <a:xfrm>
+            <a:off x="6258714" y="3054982"/>
+            <a:ext cx="2226202" cy="648001"/>
+          </a:xfrm>
+          <a:prstGeom prst="rect">
+            <a:avLst/>
+          </a:prstGeom>
+          <a:solidFill>
+            <a:schemeClr val="accent3">
+              <a:lumMod val="60000"/>
+              <a:lumOff val="40000"/>
+            </a:schemeClr>
+          </a:solidFill>
+          <a:ln>
+            <a:noFill/>
+          </a:ln>
+          <a:effectLst/>
+        </p:spPr>
+        <p:style>
+          <a:lnRef idx="1">
+            <a:schemeClr val="accent1"/>
+          </a:lnRef>
+          <a:fillRef idx="3">
+            <a:schemeClr val="accent1"/>
+          </a:fillRef>
+          <a:effectRef idx="2">
+            <a:schemeClr val="accent1"/>
+          </a:effectRef>
+          <a:fontRef idx="minor">
+            <a:schemeClr val="lt1"/>
+          </a:fontRef>
+        </p:style>
+        <p:txBody>
+          <a:bodyPr lIns="45720" tIns="22860" rIns="45720" bIns="22860" rtlCol="0" anchor="ctr"/>
+          <a:lstStyle/>
+          <a:p>
+            <a:pPr algn="ctr"/>
+            <a:r>
+              <a:rPr lang="en-US" dirty="0">
+                <a:solidFill>
+                  <a:schemeClr val="tx1"/>
+                </a:solidFill>
+                <a:latin typeface="Arial"/>
+                <a:cs typeface="Arial"/>
+              </a:rPr>
+              <a:t>Exposure Reports</a:t>
+            </a:r>
+          </a:p>
+          <a:p>
+            <a:pPr algn="ctr"/>
+            <a:r>
+              <a:rPr lang="en-US" dirty="0">
+                <a:solidFill>
+                  <a:schemeClr val="tx1"/>
+                </a:solidFill>
+                <a:latin typeface="Arial"/>
+                <a:cs typeface="Arial"/>
+              </a:rPr>
+              <a:t>XVA Reports</a:t>
+            </a:r>
+          </a:p>
+        </p:txBody>
+      </p:sp>
+      <p:sp>
+        <p:nvSpPr>
+          <p:cNvPr id="20" name="Rectangle 19"/>
+          <p:cNvSpPr/>
+          <p:nvPr/>
+        </p:nvSpPr>
+        <p:spPr>
+          <a:xfrm>
+            <a:off x="3577912" y="3763191"/>
+            <a:ext cx="2226202" cy="648000"/>
+          </a:xfrm>
+          <a:prstGeom prst="rect">
+            <a:avLst/>
+          </a:prstGeom>
+          <a:solidFill>
+            <a:schemeClr val="accent3">
+              <a:lumMod val="60000"/>
+              <a:lumOff val="40000"/>
+            </a:schemeClr>
+          </a:solidFill>
+          <a:ln>
+            <a:noFill/>
+          </a:ln>
+          <a:effectLst/>
+        </p:spPr>
+        <p:style>
+          <a:lnRef idx="1">
+            <a:schemeClr val="accent1"/>
+          </a:lnRef>
+          <a:fillRef idx="3">
+            <a:schemeClr val="accent1"/>
+          </a:fillRef>
+          <a:effectRef idx="2">
+            <a:schemeClr val="accent1"/>
+          </a:effectRef>
+          <a:fontRef idx="minor">
+            <a:schemeClr val="lt1"/>
+          </a:fontRef>
+        </p:style>
+        <p:txBody>
+          <a:bodyPr lIns="45720" tIns="22860" rIns="45720" bIns="22860" rtlCol="0" anchor="ctr"/>
+          <a:lstStyle/>
+          <a:p>
+            <a:pPr algn="ctr"/>
+            <a:r>
+              <a:rPr lang="en-US" dirty="0">
+                <a:solidFill>
+                  <a:schemeClr val="tx1"/>
+                </a:solidFill>
+                <a:latin typeface="Arial"/>
+                <a:cs typeface="Arial"/>
+              </a:rPr>
+              <a:t>NPV Cube</a:t>
+            </a:r>
+          </a:p>
+        </p:txBody>
+      </p:sp>
+      <p:sp>
+        <p:nvSpPr>
+          <p:cNvPr id="21" name="Rectangle 20"/>
+          <p:cNvSpPr/>
+          <p:nvPr/>
+        </p:nvSpPr>
+        <p:spPr>
+          <a:xfrm>
+            <a:off x="6258714" y="3763192"/>
+            <a:ext cx="2226202" cy="647999"/>
+          </a:xfrm>
+          <a:prstGeom prst="rect">
+            <a:avLst/>
+          </a:prstGeom>
+          <a:solidFill>
+            <a:schemeClr val="accent3">
+              <a:lumMod val="60000"/>
+              <a:lumOff val="40000"/>
+            </a:schemeClr>
+          </a:solidFill>
+          <a:ln>
+            <a:noFill/>
+          </a:ln>
+          <a:effectLst/>
+        </p:spPr>
+        <p:style>
+          <a:lnRef idx="1">
+            <a:schemeClr val="accent1"/>
+          </a:lnRef>
+          <a:fillRef idx="3">
+            <a:schemeClr val="accent1"/>
+          </a:fillRef>
+          <a:effectRef idx="2">
+            <a:schemeClr val="accent1"/>
+          </a:effectRef>
+          <a:fontRef idx="minor">
+            <a:schemeClr val="lt1"/>
+          </a:fontRef>
+        </p:style>
+        <p:txBody>
+          <a:bodyPr lIns="45720" tIns="22860" rIns="45720" bIns="22860" rtlCol="0" anchor="ctr"/>
+          <a:lstStyle/>
+          <a:p>
+            <a:pPr algn="ctr"/>
+            <a:r>
+              <a:rPr lang="en-US" dirty="0">
+                <a:solidFill>
+                  <a:schemeClr val="tx1"/>
+                </a:solidFill>
+                <a:latin typeface="Arial"/>
+                <a:cs typeface="Arial"/>
+              </a:rPr>
+              <a:t>Net NPV Cube</a:t>
+            </a:r>
+          </a:p>
+        </p:txBody>
+      </p:sp>
+      <p:sp>
+        <p:nvSpPr>
+          <p:cNvPr id="22" name="Rectangle 21"/>
+          <p:cNvSpPr/>
+          <p:nvPr/>
+        </p:nvSpPr>
+        <p:spPr>
+          <a:xfrm>
+            <a:off x="862790" y="3539199"/>
+            <a:ext cx="2226202" cy="396000"/>
+          </a:xfrm>
+          <a:prstGeom prst="rect">
+            <a:avLst/>
+          </a:prstGeom>
+          <a:solidFill>
+            <a:schemeClr val="accent5">
+              <a:lumMod val="60000"/>
+              <a:lumOff val="40000"/>
+            </a:schemeClr>
+          </a:solidFill>
+          <a:ln>
+            <a:noFill/>
+          </a:ln>
+          <a:effectLst/>
+        </p:spPr>
+        <p:style>
+          <a:lnRef idx="1">
+            <a:schemeClr val="accent1"/>
+          </a:lnRef>
+          <a:fillRef idx="3">
+            <a:schemeClr val="accent1"/>
+          </a:fillRef>
+          <a:effectRef idx="2">
+            <a:schemeClr val="accent1"/>
+          </a:effectRef>
+          <a:fontRef idx="minor">
+            <a:schemeClr val="lt1"/>
+          </a:fontRef>
+        </p:style>
+        <p:txBody>
+          <a:bodyPr lIns="45720" tIns="22860" rIns="45720" bIns="22860" rtlCol="0" anchor="ctr"/>
+          <a:lstStyle/>
+          <a:p>
+            <a:pPr algn="ctr"/>
+            <a:r>
+              <a:rPr lang="en-US" dirty="0">
+                <a:solidFill>
+                  <a:schemeClr val="tx1"/>
+                </a:solidFill>
+                <a:latin typeface="Arial"/>
+                <a:cs typeface="Arial"/>
+              </a:rPr>
+              <a:t>Market data</a:t>
+            </a:r>
+          </a:p>
+        </p:txBody>
+      </p:sp>
+      <p:sp>
+        <p:nvSpPr>
+          <p:cNvPr id="23" name="Rectangle 22"/>
+          <p:cNvSpPr/>
+          <p:nvPr/>
+        </p:nvSpPr>
+        <p:spPr>
+          <a:xfrm>
+            <a:off x="862790" y="4015191"/>
+            <a:ext cx="2226202" cy="396000"/>
+          </a:xfrm>
+          <a:prstGeom prst="rect">
+            <a:avLst/>
+          </a:prstGeom>
+          <a:solidFill>
+            <a:schemeClr val="accent5">
+              <a:lumMod val="60000"/>
+              <a:lumOff val="40000"/>
+            </a:schemeClr>
+          </a:solidFill>
+          <a:ln>
+            <a:noFill/>
+          </a:ln>
+          <a:effectLst/>
+        </p:spPr>
+        <p:style>
+          <a:lnRef idx="1">
+            <a:schemeClr val="accent1"/>
+          </a:lnRef>
+          <a:fillRef idx="3">
+            <a:schemeClr val="accent1"/>
+          </a:fillRef>
+          <a:effectRef idx="2">
+            <a:schemeClr val="accent1"/>
+          </a:effectRef>
+          <a:fontRef idx="minor">
+            <a:schemeClr val="lt1"/>
+          </a:fontRef>
+        </p:style>
+        <p:txBody>
+          <a:bodyPr lIns="45720" tIns="22860" rIns="45720" bIns="22860" rtlCol="0" anchor="ctr"/>
+          <a:lstStyle/>
+          <a:p>
+            <a:pPr algn="ctr"/>
+            <a:r>
+              <a:rPr lang="en-US" dirty="0" smtClean="0">
+                <a:solidFill>
+                  <a:schemeClr val="tx1"/>
+                </a:solidFill>
+                <a:latin typeface="Arial"/>
+                <a:cs typeface="Arial"/>
+              </a:rPr>
+              <a:t>Configuration (xml)</a:t>
+            </a:r>
+            <a:endParaRPr lang="en-US" dirty="0">
+              <a:solidFill>
+                <a:schemeClr val="tx1"/>
+              </a:solidFill>
+              <a:latin typeface="Arial"/>
+              <a:cs typeface="Arial"/>
+            </a:endParaRPr>
+          </a:p>
+        </p:txBody>
+      </p:sp>
+      <p:sp>
+        <p:nvSpPr>
+          <p:cNvPr id="24" name="Rectangle 23"/>
+          <p:cNvSpPr/>
+          <p:nvPr/>
+        </p:nvSpPr>
+        <p:spPr>
+          <a:xfrm>
+            <a:off x="3577912" y="4945364"/>
+            <a:ext cx="4907004" cy="684056"/>
+          </a:xfrm>
+          <a:prstGeom prst="rect">
+            <a:avLst/>
+          </a:prstGeom>
+          <a:solidFill>
+            <a:schemeClr val="bg1">
+              <a:lumMod val="85000"/>
+            </a:schemeClr>
+          </a:solidFill>
+          <a:ln>
+            <a:noFill/>
+          </a:ln>
+          <a:effectLst/>
+        </p:spPr>
+        <p:style>
+          <a:lnRef idx="1">
+            <a:schemeClr val="accent1"/>
+          </a:lnRef>
+          <a:fillRef idx="3">
+            <a:schemeClr val="accent1"/>
+          </a:fillRef>
+          <a:effectRef idx="2">
+            <a:schemeClr val="accent1"/>
+          </a:effectRef>
+          <a:fontRef idx="minor">
+            <a:schemeClr val="lt1"/>
+          </a:fontRef>
+        </p:style>
+        <p:txBody>
+          <a:bodyPr lIns="45720" tIns="22860" rIns="45720" bIns="22860" rtlCol="0" anchor="ctr"/>
+          <a:lstStyle/>
+          <a:p>
+            <a:pPr algn="ctr"/>
+            <a:r>
+              <a:rPr lang="en-US" dirty="0">
+                <a:solidFill>
+                  <a:schemeClr val="tx1"/>
+                </a:solidFill>
+                <a:latin typeface="Arial"/>
+                <a:cs typeface="Arial"/>
+              </a:rPr>
+              <a:t>Interactive </a:t>
+            </a:r>
+            <a:r>
+              <a:rPr lang="en-US" dirty="0" err="1">
+                <a:solidFill>
+                  <a:schemeClr val="tx1"/>
+                </a:solidFill>
+                <a:latin typeface="Arial"/>
+                <a:cs typeface="Arial"/>
+              </a:rPr>
+              <a:t>Visualisation</a:t>
+            </a:r>
+            <a:r>
+              <a:rPr lang="en-US" dirty="0">
+                <a:solidFill>
+                  <a:schemeClr val="tx1"/>
+                </a:solidFill>
+                <a:latin typeface="Arial"/>
+                <a:cs typeface="Arial"/>
+              </a:rPr>
+              <a:t>: </a:t>
+            </a:r>
+          </a:p>
+          <a:p>
+            <a:pPr algn="ctr"/>
+            <a:r>
+              <a:rPr lang="en-US" dirty="0">
+                <a:solidFill>
+                  <a:schemeClr val="tx1"/>
+                </a:solidFill>
+                <a:latin typeface="Arial"/>
+                <a:cs typeface="Arial"/>
+              </a:rPr>
+              <a:t>Evolution of Exposure and NPV distributions</a:t>
+            </a:r>
+          </a:p>
+        </p:txBody>
+      </p:sp>
+      <p:sp>
+        <p:nvSpPr>
+          <p:cNvPr id="26" name="Down Arrow 25"/>
+          <p:cNvSpPr/>
+          <p:nvPr/>
+        </p:nvSpPr>
+        <p:spPr>
+          <a:xfrm>
+            <a:off x="7222762" y="4453360"/>
+            <a:ext cx="274578" cy="423353"/>
+          </a:xfrm>
+          <a:prstGeom prst="downArrow">
+            <a:avLst/>
+          </a:prstGeom>
+          <a:solidFill>
+            <a:schemeClr val="bg1">
+              <a:lumMod val="75000"/>
+            </a:schemeClr>
+          </a:solidFill>
+          <a:ln>
+            <a:noFill/>
+          </a:ln>
+          <a:effectLst/>
+        </p:spPr>
+        <p:style>
+          <a:lnRef idx="1">
+            <a:schemeClr val="accent1"/>
+          </a:lnRef>
+          <a:fillRef idx="3">
+            <a:schemeClr val="accent1"/>
+          </a:fillRef>
+          <a:effectRef idx="2">
+            <a:schemeClr val="accent1"/>
+          </a:effectRef>
+          <a:fontRef idx="minor">
+            <a:schemeClr val="lt1"/>
+          </a:fontRef>
+        </p:style>
+        <p:txBody>
+          <a:bodyPr lIns="45720" tIns="22860" rIns="45720" bIns="22860" rtlCol="0" anchor="ctr"/>
+          <a:lstStyle/>
+          <a:p>
+            <a:pPr algn="ctr"/>
+            <a:endParaRPr lang="en-US">
+              <a:latin typeface="Arial"/>
+              <a:cs typeface="Arial"/>
+            </a:endParaRPr>
+          </a:p>
+        </p:txBody>
+      </p:sp>
+      <p:sp>
+        <p:nvSpPr>
+          <p:cNvPr id="27" name="Down Arrow 26"/>
+          <p:cNvSpPr/>
+          <p:nvPr/>
+        </p:nvSpPr>
+        <p:spPr>
+          <a:xfrm>
+            <a:off x="4595066" y="4453360"/>
+            <a:ext cx="274578" cy="423353"/>
+          </a:xfrm>
+          <a:prstGeom prst="downArrow">
+            <a:avLst/>
+          </a:prstGeom>
+          <a:solidFill>
+            <a:schemeClr val="bg1">
+              <a:lumMod val="75000"/>
+            </a:schemeClr>
+          </a:solidFill>
+          <a:ln>
+            <a:noFill/>
+          </a:ln>
+          <a:effectLst/>
+        </p:spPr>
+        <p:style>
+          <a:lnRef idx="1">
+            <a:schemeClr val="accent1"/>
+          </a:lnRef>
+          <a:fillRef idx="3">
+            <a:schemeClr val="accent1"/>
+          </a:fillRef>
+          <a:effectRef idx="2">
+            <a:schemeClr val="accent1"/>
+          </a:effectRef>
+          <a:fontRef idx="minor">
+            <a:schemeClr val="lt1"/>
+          </a:fontRef>
+        </p:style>
+        <p:txBody>
+          <a:bodyPr lIns="45720" tIns="22860" rIns="45720" bIns="22860" rtlCol="0" anchor="ctr"/>
+          <a:lstStyle/>
+          <a:p>
+            <a:pPr algn="ctr"/>
+            <a:endParaRPr lang="en-US">
+              <a:latin typeface="Arial"/>
+              <a:cs typeface="Arial"/>
+            </a:endParaRPr>
+          </a:p>
+        </p:txBody>
+      </p:sp>
+      <p:sp>
+        <p:nvSpPr>
+          <p:cNvPr id="25" name="Rectangle 24"/>
+          <p:cNvSpPr/>
+          <p:nvPr/>
+        </p:nvSpPr>
+        <p:spPr>
+          <a:xfrm>
+            <a:off x="851349" y="4964524"/>
+            <a:ext cx="1436796" cy="331374"/>
+          </a:xfrm>
+          <a:prstGeom prst="rect">
+            <a:avLst/>
+          </a:prstGeom>
+          <a:solidFill>
+            <a:schemeClr val="accent5">
+              <a:lumMod val="60000"/>
+              <a:lumOff val="40000"/>
+            </a:schemeClr>
+          </a:solidFill>
+          <a:ln>
+            <a:noFill/>
+          </a:ln>
+          <a:effectLst/>
+        </p:spPr>
+        <p:style>
+          <a:lnRef idx="1">
+            <a:schemeClr val="accent1"/>
+          </a:lnRef>
+          <a:fillRef idx="3">
+            <a:schemeClr val="accent1"/>
+          </a:fillRef>
+          <a:effectRef idx="2">
+            <a:schemeClr val="accent1"/>
+          </a:effectRef>
+          <a:fontRef idx="minor">
+            <a:schemeClr val="lt1"/>
+          </a:fontRef>
+        </p:style>
+        <p:txBody>
+          <a:bodyPr lIns="45720" tIns="22860" rIns="45720" bIns="22860" rtlCol="0" anchor="ctr"/>
+          <a:lstStyle/>
+          <a:p>
+            <a:pPr algn="ctr"/>
+            <a:r>
+              <a:rPr lang="en-US" dirty="0" smtClean="0">
+                <a:solidFill>
+                  <a:schemeClr val="tx1"/>
+                </a:solidFill>
+                <a:latin typeface="Arial"/>
+                <a:cs typeface="Arial"/>
+              </a:rPr>
+              <a:t>Input</a:t>
+            </a:r>
+            <a:endParaRPr lang="en-US" dirty="0">
+              <a:solidFill>
+                <a:schemeClr val="tx1"/>
+              </a:solidFill>
+              <a:latin typeface="Arial"/>
+              <a:cs typeface="Arial"/>
+            </a:endParaRPr>
+          </a:p>
+        </p:txBody>
+      </p:sp>
+      <p:sp>
+        <p:nvSpPr>
+          <p:cNvPr id="28" name="Rectangle 27"/>
+          <p:cNvSpPr/>
+          <p:nvPr/>
+        </p:nvSpPr>
+        <p:spPr>
+          <a:xfrm>
+            <a:off x="851349" y="5296339"/>
+            <a:ext cx="1436796" cy="331374"/>
+          </a:xfrm>
+          <a:prstGeom prst="rect">
+            <a:avLst/>
+          </a:prstGeom>
+          <a:solidFill>
+            <a:schemeClr val="accent3">
+              <a:lumMod val="60000"/>
+              <a:lumOff val="40000"/>
+            </a:schemeClr>
+          </a:solidFill>
+          <a:ln>
+            <a:noFill/>
+          </a:ln>
+          <a:effectLst/>
+        </p:spPr>
+        <p:style>
+          <a:lnRef idx="1">
+            <a:schemeClr val="accent1"/>
+          </a:lnRef>
+          <a:fillRef idx="3">
+            <a:schemeClr val="accent1"/>
+          </a:fillRef>
+          <a:effectRef idx="2">
+            <a:schemeClr val="accent1"/>
+          </a:effectRef>
+          <a:fontRef idx="minor">
+            <a:schemeClr val="lt1"/>
+          </a:fontRef>
+        </p:style>
+        <p:txBody>
+          <a:bodyPr lIns="45720" tIns="22860" rIns="45720" bIns="22860" rtlCol="0" anchor="ctr"/>
+          <a:lstStyle/>
+          <a:p>
+            <a:pPr algn="ctr"/>
+            <a:r>
+              <a:rPr lang="en-US" dirty="0" smtClean="0">
+                <a:solidFill>
+                  <a:schemeClr val="tx1"/>
+                </a:solidFill>
+                <a:latin typeface="Arial"/>
+                <a:cs typeface="Arial"/>
+              </a:rPr>
+              <a:t>Output</a:t>
+            </a:r>
+            <a:endParaRPr lang="en-US" dirty="0">
+              <a:solidFill>
+                <a:schemeClr val="tx1"/>
+              </a:solidFill>
+              <a:latin typeface="Arial"/>
+              <a:cs typeface="Arial"/>
+            </a:endParaRPr>
+          </a:p>
+        </p:txBody>
+      </p:sp>
+      <p:sp>
+        <p:nvSpPr>
+          <p:cNvPr id="29" name="Rectangle 28"/>
+          <p:cNvSpPr/>
+          <p:nvPr/>
+        </p:nvSpPr>
+        <p:spPr>
+          <a:xfrm>
+            <a:off x="851349" y="4653443"/>
+            <a:ext cx="1436796" cy="328699"/>
+          </a:xfrm>
+          <a:prstGeom prst="rect">
+            <a:avLst/>
+          </a:prstGeom>
+          <a:solidFill>
+            <a:schemeClr val="bg1">
+              <a:lumMod val="85000"/>
+            </a:schemeClr>
+          </a:solidFill>
+          <a:ln>
+            <a:noFill/>
+          </a:ln>
+          <a:effectLst/>
+        </p:spPr>
+        <p:style>
+          <a:lnRef idx="1">
+            <a:schemeClr val="accent1"/>
+          </a:lnRef>
+          <a:fillRef idx="3">
+            <a:schemeClr val="accent1"/>
+          </a:fillRef>
+          <a:effectRef idx="2">
+            <a:schemeClr val="accent1"/>
+          </a:effectRef>
+          <a:fontRef idx="minor">
+            <a:schemeClr val="lt1"/>
+          </a:fontRef>
+        </p:style>
+        <p:txBody>
+          <a:bodyPr lIns="45720" tIns="22860" rIns="45720" bIns="22860" rtlCol="0" anchor="ctr"/>
+          <a:lstStyle/>
+          <a:p>
+            <a:pPr algn="ctr"/>
+            <a:r>
+              <a:rPr lang="en-US" dirty="0" smtClean="0">
+                <a:solidFill>
+                  <a:schemeClr val="tx1"/>
+                </a:solidFill>
+                <a:latin typeface="Arial"/>
+                <a:cs typeface="Arial"/>
+              </a:rPr>
+              <a:t>Processing</a:t>
+            </a:r>
+            <a:endParaRPr lang="en-US" dirty="0">
+              <a:solidFill>
+                <a:schemeClr val="tx1"/>
+              </a:solidFill>
+              <a:latin typeface="Arial"/>
+              <a:cs typeface="Arial"/>
+            </a:endParaRPr>
+          </a:p>
+        </p:txBody>
+      </p:sp>
+    </p:spTree>
+    <p:extLst>
+      <p:ext uri="{BB962C8B-B14F-4D97-AF65-F5344CB8AC3E}">
+        <p14:creationId xmlns:p14="http://schemas.microsoft.com/office/powerpoint/2010/main" val="1633536789"/>
       </p:ext>
     </p:extLst>
   </p:cSld>

</xml_diff>